<commit_message>
Start of Composite tile spec
</commit_message>
<xml_diff>
--- a/b3dm/figures/Figures.pptx
+++ b/b3dm/figures/Figures.pptx
@@ -304,7 +304,7 @@
           <a:p>
             <a:fld id="{E44376AC-B3C2-8643-B9A3-A6905164CDF3}" type="datetimeFigureOut">
               <a:rPr lang="en-US" smtClean="0"/>
-              <a:t>6/5/2015</a:t>
+              <a:t>11/5/2015</a:t>
             </a:fld>
             <a:endParaRPr lang="en-US"/>
           </a:p>
@@ -474,7 +474,7 @@
           <a:p>
             <a:fld id="{E44376AC-B3C2-8643-B9A3-A6905164CDF3}" type="datetimeFigureOut">
               <a:rPr lang="en-US" smtClean="0"/>
-              <a:t>6/5/2015</a:t>
+              <a:t>11/5/2015</a:t>
             </a:fld>
             <a:endParaRPr lang="en-US"/>
           </a:p>
@@ -654,7 +654,7 @@
           <a:p>
             <a:fld id="{E44376AC-B3C2-8643-B9A3-A6905164CDF3}" type="datetimeFigureOut">
               <a:rPr lang="en-US" smtClean="0"/>
-              <a:t>6/5/2015</a:t>
+              <a:t>11/5/2015</a:t>
             </a:fld>
             <a:endParaRPr lang="en-US"/>
           </a:p>
@@ -824,7 +824,7 @@
           <a:p>
             <a:fld id="{E44376AC-B3C2-8643-B9A3-A6905164CDF3}" type="datetimeFigureOut">
               <a:rPr lang="en-US" smtClean="0"/>
-              <a:t>6/5/2015</a:t>
+              <a:t>11/5/2015</a:t>
             </a:fld>
             <a:endParaRPr lang="en-US"/>
           </a:p>
@@ -1070,7 +1070,7 @@
           <a:p>
             <a:fld id="{E44376AC-B3C2-8643-B9A3-A6905164CDF3}" type="datetimeFigureOut">
               <a:rPr lang="en-US" smtClean="0"/>
-              <a:t>6/5/2015</a:t>
+              <a:t>11/5/2015</a:t>
             </a:fld>
             <a:endParaRPr lang="en-US"/>
           </a:p>
@@ -1358,7 +1358,7 @@
           <a:p>
             <a:fld id="{E44376AC-B3C2-8643-B9A3-A6905164CDF3}" type="datetimeFigureOut">
               <a:rPr lang="en-US" smtClean="0"/>
-              <a:t>6/5/2015</a:t>
+              <a:t>11/5/2015</a:t>
             </a:fld>
             <a:endParaRPr lang="en-US"/>
           </a:p>
@@ -1780,7 +1780,7 @@
           <a:p>
             <a:fld id="{E44376AC-B3C2-8643-B9A3-A6905164CDF3}" type="datetimeFigureOut">
               <a:rPr lang="en-US" smtClean="0"/>
-              <a:t>6/5/2015</a:t>
+              <a:t>11/5/2015</a:t>
             </a:fld>
             <a:endParaRPr lang="en-US"/>
           </a:p>
@@ -1898,7 +1898,7 @@
           <a:p>
             <a:fld id="{E44376AC-B3C2-8643-B9A3-A6905164CDF3}" type="datetimeFigureOut">
               <a:rPr lang="en-US" smtClean="0"/>
-              <a:t>6/5/2015</a:t>
+              <a:t>11/5/2015</a:t>
             </a:fld>
             <a:endParaRPr lang="en-US"/>
           </a:p>
@@ -1993,7 +1993,7 @@
           <a:p>
             <a:fld id="{E44376AC-B3C2-8643-B9A3-A6905164CDF3}" type="datetimeFigureOut">
               <a:rPr lang="en-US" smtClean="0"/>
-              <a:t>6/5/2015</a:t>
+              <a:t>11/5/2015</a:t>
             </a:fld>
             <a:endParaRPr lang="en-US"/>
           </a:p>
@@ -2270,7 +2270,7 @@
           <a:p>
             <a:fld id="{E44376AC-B3C2-8643-B9A3-A6905164CDF3}" type="datetimeFigureOut">
               <a:rPr lang="en-US" smtClean="0"/>
-              <a:t>6/5/2015</a:t>
+              <a:t>11/5/2015</a:t>
             </a:fld>
             <a:endParaRPr lang="en-US"/>
           </a:p>
@@ -2523,7 +2523,7 @@
           <a:p>
             <a:fld id="{E44376AC-B3C2-8643-B9A3-A6905164CDF3}" type="datetimeFigureOut">
               <a:rPr lang="en-US" smtClean="0"/>
-              <a:t>6/5/2015</a:t>
+              <a:t>11/5/2015</a:t>
             </a:fld>
             <a:endParaRPr lang="en-US"/>
           </a:p>
@@ -2736,7 +2736,7 @@
           <a:p>
             <a:fld id="{E44376AC-B3C2-8643-B9A3-A6905164CDF3}" type="datetimeFigureOut">
               <a:rPr lang="en-US" smtClean="0"/>
-              <a:t>6/5/2015</a:t>
+              <a:t>11/5/2015</a:t>
             </a:fld>
             <a:endParaRPr lang="en-US"/>
           </a:p>
@@ -3267,7 +3267,7 @@
         </p:nvSpPr>
         <p:spPr>
           <a:xfrm>
-            <a:off x="5666328" y="662695"/>
+            <a:off x="6780736" y="661915"/>
             <a:ext cx="1207382" cy="461665"/>
           </a:xfrm>
           <a:prstGeom prst="rect">
@@ -3312,7 +3312,7 @@
         </p:nvSpPr>
         <p:spPr>
           <a:xfrm>
-            <a:off x="5602541" y="1515294"/>
+            <a:off x="6716949" y="1514514"/>
             <a:ext cx="1342573" cy="616860"/>
           </a:xfrm>
           <a:prstGeom prst="ellipse">
@@ -3424,7 +3424,7 @@
                 <a:latin typeface="Courier New"/>
                 <a:cs typeface="Courier New"/>
               </a:rPr>
-              <a:t>12-byte </a:t>
+              <a:t>16-byte </a:t>
             </a:r>
             <a:r>
               <a:rPr lang="en-US" sz="1200" dirty="0" smtClean="0">
@@ -3451,7 +3451,7 @@
         </p:nvCxnSpPr>
         <p:spPr>
           <a:xfrm>
-            <a:off x="6270019" y="1124360"/>
+            <a:off x="7384427" y="1123580"/>
             <a:ext cx="3809" cy="390934"/>
           </a:xfrm>
           <a:prstGeom prst="straightConnector1">
@@ -3488,7 +3488,7 @@
         </p:nvSpPr>
         <p:spPr>
           <a:xfrm>
-            <a:off x="2880187" y="662695"/>
+            <a:off x="3994595" y="661915"/>
             <a:ext cx="1672253" cy="461665"/>
           </a:xfrm>
           <a:prstGeom prst="rect">
@@ -3515,10 +3515,6 @@
               </a:rPr>
               <a:t>batchTableLength</a:t>
             </a:r>
-            <a:endParaRPr lang="en-US" sz="1200" dirty="0" smtClean="0">
-              <a:latin typeface="Courier New"/>
-              <a:cs typeface="Courier New"/>
-            </a:endParaRPr>
           </a:p>
           <a:p>
             <a:pPr algn="ctr"/>
@@ -3564,7 +3560,7 @@
         </p:nvSpPr>
         <p:spPr>
           <a:xfrm>
-            <a:off x="4552440" y="662695"/>
+            <a:off x="5666848" y="661915"/>
             <a:ext cx="1114408" cy="461665"/>
           </a:xfrm>
           <a:prstGeom prst="rect">
@@ -3595,6 +3591,82 @@
           </a:p>
           <a:p>
             <a:pPr algn="ctr"/>
+            <a:endParaRPr lang="en-US" sz="1200" dirty="0">
+              <a:latin typeface="Courier New"/>
+              <a:cs typeface="Courier New"/>
+            </a:endParaRPr>
+          </a:p>
+        </p:txBody>
+      </p:sp>
+      <p:sp>
+        <p:nvSpPr>
+          <p:cNvPr id="12" name="TextBox 11"/>
+          <p:cNvSpPr txBox="1"/>
+          <p:nvPr/>
+        </p:nvSpPr>
+        <p:spPr>
+          <a:xfrm>
+            <a:off x="2880187" y="662694"/>
+            <a:ext cx="1114408" cy="461665"/>
+          </a:xfrm>
+          <a:prstGeom prst="rect">
+            <a:avLst/>
+          </a:prstGeom>
+          <a:noFill/>
+          <a:ln w="12700" cmpd="sng">
+            <a:solidFill>
+              <a:schemeClr val="tx1"/>
+            </a:solidFill>
+          </a:ln>
+        </p:spPr>
+        <p:txBody>
+          <a:bodyPr wrap="none" rtlCol="0">
+            <a:spAutoFit/>
+          </a:bodyPr>
+          <a:lstStyle/>
+          <a:p>
+            <a:pPr algn="ctr"/>
+            <a:r>
+              <a:rPr lang="en-US" sz="1200" dirty="0" smtClean="0">
+                <a:latin typeface="Courier New"/>
+                <a:cs typeface="Courier New"/>
+              </a:rPr>
+              <a:t>byteLength</a:t>
+            </a:r>
+            <a:endParaRPr lang="en-US" sz="1200" dirty="0" smtClean="0">
+              <a:latin typeface="Courier New"/>
+              <a:cs typeface="Courier New"/>
+            </a:endParaRPr>
+          </a:p>
+          <a:p>
+            <a:pPr algn="ctr"/>
+            <a:r>
+              <a:rPr lang="en-US" sz="1200" dirty="0" smtClean="0">
+                <a:latin typeface="Courier New"/>
+                <a:cs typeface="Courier New"/>
+              </a:rPr>
+              <a:t>(</a:t>
+            </a:r>
+            <a:r>
+              <a:rPr lang="en-US" sz="1200" dirty="0" smtClean="0">
+                <a:solidFill>
+                  <a:schemeClr val="tx2">
+                    <a:lumMod val="60000"/>
+                    <a:lumOff val="40000"/>
+                  </a:schemeClr>
+                </a:solidFill>
+                <a:latin typeface="Courier New"/>
+                <a:cs typeface="Courier New"/>
+              </a:rPr>
+              <a:t>uint32</a:t>
+            </a:r>
+            <a:r>
+              <a:rPr lang="en-US" sz="1200" dirty="0" smtClean="0">
+                <a:latin typeface="Courier New"/>
+                <a:cs typeface="Courier New"/>
+              </a:rPr>
+              <a:t>)</a:t>
+            </a:r>
             <a:endParaRPr lang="en-US" sz="1200" dirty="0">
               <a:latin typeface="Courier New"/>
               <a:cs typeface="Courier New"/>

</xml_diff>

<commit_message>
Updates based on review
</commit_message>
<xml_diff>
--- a/b3dm/figures/Figures.pptx
+++ b/b3dm/figures/Figures.pptx
@@ -304,7 +304,7 @@
           <a:p>
             <a:fld id="{E44376AC-B3C2-8643-B9A3-A6905164CDF3}" type="datetimeFigureOut">
               <a:rPr lang="en-US" smtClean="0"/>
-              <a:t>11/5/2015</a:t>
+              <a:t>11/7/2015</a:t>
             </a:fld>
             <a:endParaRPr lang="en-US"/>
           </a:p>
@@ -474,7 +474,7 @@
           <a:p>
             <a:fld id="{E44376AC-B3C2-8643-B9A3-A6905164CDF3}" type="datetimeFigureOut">
               <a:rPr lang="en-US" smtClean="0"/>
-              <a:t>11/5/2015</a:t>
+              <a:t>11/7/2015</a:t>
             </a:fld>
             <a:endParaRPr lang="en-US"/>
           </a:p>
@@ -654,7 +654,7 @@
           <a:p>
             <a:fld id="{E44376AC-B3C2-8643-B9A3-A6905164CDF3}" type="datetimeFigureOut">
               <a:rPr lang="en-US" smtClean="0"/>
-              <a:t>11/5/2015</a:t>
+              <a:t>11/7/2015</a:t>
             </a:fld>
             <a:endParaRPr lang="en-US"/>
           </a:p>
@@ -824,7 +824,7 @@
           <a:p>
             <a:fld id="{E44376AC-B3C2-8643-B9A3-A6905164CDF3}" type="datetimeFigureOut">
               <a:rPr lang="en-US" smtClean="0"/>
-              <a:t>11/5/2015</a:t>
+              <a:t>11/7/2015</a:t>
             </a:fld>
             <a:endParaRPr lang="en-US"/>
           </a:p>
@@ -1070,7 +1070,7 @@
           <a:p>
             <a:fld id="{E44376AC-B3C2-8643-B9A3-A6905164CDF3}" type="datetimeFigureOut">
               <a:rPr lang="en-US" smtClean="0"/>
-              <a:t>11/5/2015</a:t>
+              <a:t>11/7/2015</a:t>
             </a:fld>
             <a:endParaRPr lang="en-US"/>
           </a:p>
@@ -1358,7 +1358,7 @@
           <a:p>
             <a:fld id="{E44376AC-B3C2-8643-B9A3-A6905164CDF3}" type="datetimeFigureOut">
               <a:rPr lang="en-US" smtClean="0"/>
-              <a:t>11/5/2015</a:t>
+              <a:t>11/7/2015</a:t>
             </a:fld>
             <a:endParaRPr lang="en-US"/>
           </a:p>
@@ -1780,7 +1780,7 @@
           <a:p>
             <a:fld id="{E44376AC-B3C2-8643-B9A3-A6905164CDF3}" type="datetimeFigureOut">
               <a:rPr lang="en-US" smtClean="0"/>
-              <a:t>11/5/2015</a:t>
+              <a:t>11/7/2015</a:t>
             </a:fld>
             <a:endParaRPr lang="en-US"/>
           </a:p>
@@ -1898,7 +1898,7 @@
           <a:p>
             <a:fld id="{E44376AC-B3C2-8643-B9A3-A6905164CDF3}" type="datetimeFigureOut">
               <a:rPr lang="en-US" smtClean="0"/>
-              <a:t>11/5/2015</a:t>
+              <a:t>11/7/2015</a:t>
             </a:fld>
             <a:endParaRPr lang="en-US"/>
           </a:p>
@@ -1993,7 +1993,7 @@
           <a:p>
             <a:fld id="{E44376AC-B3C2-8643-B9A3-A6905164CDF3}" type="datetimeFigureOut">
               <a:rPr lang="en-US" smtClean="0"/>
-              <a:t>11/5/2015</a:t>
+              <a:t>11/7/2015</a:t>
             </a:fld>
             <a:endParaRPr lang="en-US"/>
           </a:p>
@@ -2270,7 +2270,7 @@
           <a:p>
             <a:fld id="{E44376AC-B3C2-8643-B9A3-A6905164CDF3}" type="datetimeFigureOut">
               <a:rPr lang="en-US" smtClean="0"/>
-              <a:t>11/5/2015</a:t>
+              <a:t>11/7/2015</a:t>
             </a:fld>
             <a:endParaRPr lang="en-US"/>
           </a:p>
@@ -2523,7 +2523,7 @@
           <a:p>
             <a:fld id="{E44376AC-B3C2-8643-B9A3-A6905164CDF3}" type="datetimeFigureOut">
               <a:rPr lang="en-US" smtClean="0"/>
-              <a:t>11/5/2015</a:t>
+              <a:t>11/7/2015</a:t>
             </a:fld>
             <a:endParaRPr lang="en-US"/>
           </a:p>
@@ -2736,7 +2736,7 @@
           <a:p>
             <a:fld id="{E44376AC-B3C2-8643-B9A3-A6905164CDF3}" type="datetimeFigureOut">
               <a:rPr lang="en-US" smtClean="0"/>
-              <a:t>11/5/2015</a:t>
+              <a:t>11/7/2015</a:t>
             </a:fld>
             <a:endParaRPr lang="en-US"/>
           </a:p>
@@ -3119,7 +3119,7 @@
         </p:nvSpPr>
         <p:spPr>
           <a:xfrm>
-            <a:off x="109807" y="662695"/>
+            <a:off x="195825" y="668709"/>
             <a:ext cx="1846930" cy="461665"/>
           </a:xfrm>
           <a:prstGeom prst="rect">
@@ -3195,7 +3195,7 @@
         </p:nvSpPr>
         <p:spPr>
           <a:xfrm>
-            <a:off x="1956737" y="662695"/>
+            <a:off x="2042755" y="668709"/>
             <a:ext cx="923450" cy="461665"/>
           </a:xfrm>
           <a:prstGeom prst="rect">
@@ -3267,7 +3267,7 @@
         </p:nvSpPr>
         <p:spPr>
           <a:xfrm>
-            <a:off x="6780736" y="661915"/>
+            <a:off x="1381117" y="2111194"/>
             <a:ext cx="1207382" cy="461665"/>
           </a:xfrm>
           <a:prstGeom prst="rect">
@@ -3312,7 +3312,7 @@
         </p:nvSpPr>
         <p:spPr>
           <a:xfrm>
-            <a:off x="6716949" y="1514514"/>
+            <a:off x="1317330" y="2963793"/>
             <a:ext cx="1342573" cy="616860"/>
           </a:xfrm>
           <a:prstGeom prst="ellipse">
@@ -3363,8 +3363,8 @@
         </p:nvCxnSpPr>
         <p:spPr>
           <a:xfrm>
-            <a:off x="109807" y="399926"/>
-            <a:ext cx="4442633" cy="0"/>
+            <a:off x="195825" y="405940"/>
+            <a:ext cx="6777395" cy="0"/>
           </a:xfrm>
           <a:prstGeom prst="straightConnector1">
             <a:avLst/>
@@ -3400,7 +3400,7 @@
         </p:nvSpPr>
         <p:spPr>
           <a:xfrm>
-            <a:off x="1587971" y="122927"/>
+            <a:off x="2841370" y="128941"/>
             <a:ext cx="1486305" cy="276999"/>
           </a:xfrm>
           <a:prstGeom prst="rect">
@@ -3424,7 +3424,7 @@
                 <a:latin typeface="Courier New"/>
                 <a:cs typeface="Courier New"/>
               </a:rPr>
-              <a:t>16-byte </a:t>
+              <a:t>20-byte </a:t>
             </a:r>
             <a:r>
               <a:rPr lang="en-US" sz="1200" dirty="0" smtClean="0">
@@ -3451,7 +3451,7 @@
         </p:nvCxnSpPr>
         <p:spPr>
           <a:xfrm>
-            <a:off x="7384427" y="1123580"/>
+            <a:off x="1984808" y="2572859"/>
             <a:ext cx="3809" cy="390934"/>
           </a:xfrm>
           <a:prstGeom prst="straightConnector1">
@@ -3488,7 +3488,7 @@
         </p:nvSpPr>
         <p:spPr>
           <a:xfrm>
-            <a:off x="3994595" y="661915"/>
+            <a:off x="5300967" y="668709"/>
             <a:ext cx="1672253" cy="461665"/>
           </a:xfrm>
           <a:prstGeom prst="rect">
@@ -3560,7 +3560,7 @@
         </p:nvSpPr>
         <p:spPr>
           <a:xfrm>
-            <a:off x="5666848" y="661915"/>
+            <a:off x="267229" y="2111194"/>
             <a:ext cx="1114408" cy="461665"/>
           </a:xfrm>
           <a:prstGeom prst="rect">
@@ -3606,7 +3606,7 @@
         </p:nvSpPr>
         <p:spPr>
           <a:xfrm>
-            <a:off x="2880187" y="662694"/>
+            <a:off x="2966205" y="668709"/>
             <a:ext cx="1114408" cy="461665"/>
           </a:xfrm>
           <a:prstGeom prst="rect">
@@ -3633,10 +3633,6 @@
               </a:rPr>
               <a:t>byteLength</a:t>
             </a:r>
-            <a:endParaRPr lang="en-US" sz="1200" dirty="0" smtClean="0">
-              <a:latin typeface="Courier New"/>
-              <a:cs typeface="Courier New"/>
-            </a:endParaRPr>
           </a:p>
           <a:p>
             <a:pPr algn="ctr"/>
@@ -3666,6 +3662,160 @@
                 <a:cs typeface="Courier New"/>
               </a:rPr>
               <a:t>)</a:t>
+            </a:r>
+            <a:endParaRPr lang="en-US" sz="1200" dirty="0">
+              <a:latin typeface="Courier New"/>
+              <a:cs typeface="Courier New"/>
+            </a:endParaRPr>
+          </a:p>
+        </p:txBody>
+      </p:sp>
+      <p:sp>
+        <p:nvSpPr>
+          <p:cNvPr id="15" name="TextBox 14"/>
+          <p:cNvSpPr txBox="1"/>
+          <p:nvPr/>
+        </p:nvSpPr>
+        <p:spPr>
+          <a:xfrm>
+            <a:off x="4087099" y="668709"/>
+            <a:ext cx="1207382" cy="461665"/>
+          </a:xfrm>
+          <a:prstGeom prst="rect">
+            <a:avLst/>
+          </a:prstGeom>
+          <a:noFill/>
+          <a:ln w="12700" cmpd="sng">
+            <a:solidFill>
+              <a:schemeClr val="tx1"/>
+            </a:solidFill>
+          </a:ln>
+        </p:spPr>
+        <p:txBody>
+          <a:bodyPr wrap="none" rtlCol="0">
+            <a:spAutoFit/>
+          </a:bodyPr>
+          <a:lstStyle/>
+          <a:p>
+            <a:pPr algn="ctr"/>
+            <a:r>
+              <a:rPr lang="en-US" sz="1200" dirty="0" smtClean="0">
+                <a:latin typeface="Courier New"/>
+                <a:cs typeface="Courier New"/>
+              </a:rPr>
+              <a:t>batchLength</a:t>
+            </a:r>
+            <a:endParaRPr lang="en-US" sz="1200" dirty="0" smtClean="0">
+              <a:latin typeface="Courier New"/>
+              <a:cs typeface="Courier New"/>
+            </a:endParaRPr>
+          </a:p>
+          <a:p>
+            <a:pPr algn="ctr"/>
+            <a:r>
+              <a:rPr lang="en-US" sz="1200" dirty="0" smtClean="0">
+                <a:latin typeface="Courier New"/>
+                <a:cs typeface="Courier New"/>
+              </a:rPr>
+              <a:t>(</a:t>
+            </a:r>
+            <a:r>
+              <a:rPr lang="en-US" sz="1200" dirty="0" smtClean="0">
+                <a:solidFill>
+                  <a:schemeClr val="tx2">
+                    <a:lumMod val="60000"/>
+                    <a:lumOff val="40000"/>
+                  </a:schemeClr>
+                </a:solidFill>
+                <a:latin typeface="Courier New"/>
+                <a:cs typeface="Courier New"/>
+              </a:rPr>
+              <a:t>uint32</a:t>
+            </a:r>
+            <a:r>
+              <a:rPr lang="en-US" sz="1200" dirty="0" smtClean="0">
+                <a:latin typeface="Courier New"/>
+                <a:cs typeface="Courier New"/>
+              </a:rPr>
+              <a:t>)</a:t>
+            </a:r>
+            <a:endParaRPr lang="en-US" sz="1200" dirty="0">
+              <a:latin typeface="Courier New"/>
+              <a:cs typeface="Courier New"/>
+            </a:endParaRPr>
+          </a:p>
+        </p:txBody>
+      </p:sp>
+      <p:cxnSp>
+        <p:nvCxnSpPr>
+          <p:cNvPr id="16" name="Straight Arrow Connector 15"/>
+          <p:cNvCxnSpPr/>
+          <p:nvPr/>
+        </p:nvCxnSpPr>
+        <p:spPr>
+          <a:xfrm>
+            <a:off x="267229" y="1858222"/>
+            <a:ext cx="2321270" cy="0"/>
+          </a:xfrm>
+          <a:prstGeom prst="straightConnector1">
+            <a:avLst/>
+          </a:prstGeom>
+          <a:ln w="12700" cmpd="sng">
+            <a:solidFill>
+              <a:schemeClr val="tx1"/>
+            </a:solidFill>
+            <a:headEnd type="arrow"/>
+            <a:tailEnd type="arrow"/>
+          </a:ln>
+        </p:spPr>
+        <p:style>
+          <a:lnRef idx="2">
+            <a:schemeClr val="accent1"/>
+          </a:lnRef>
+          <a:fillRef idx="0">
+            <a:schemeClr val="accent1"/>
+          </a:fillRef>
+          <a:effectRef idx="1">
+            <a:schemeClr val="accent1"/>
+          </a:effectRef>
+          <a:fontRef idx="minor">
+            <a:schemeClr val="tx1"/>
+          </a:fontRef>
+        </p:style>
+      </p:cxnSp>
+      <p:sp>
+        <p:nvSpPr>
+          <p:cNvPr id="17" name="TextBox 16"/>
+          <p:cNvSpPr txBox="1"/>
+          <p:nvPr/>
+        </p:nvSpPr>
+        <p:spPr>
+          <a:xfrm>
+            <a:off x="1149582" y="1518726"/>
+            <a:ext cx="556563" cy="276999"/>
+          </a:xfrm>
+          <a:prstGeom prst="rect">
+            <a:avLst/>
+          </a:prstGeom>
+          <a:noFill/>
+          <a:ln w="12700" cmpd="sng">
+            <a:noFill/>
+            <a:prstDash val="lgDash"/>
+          </a:ln>
+        </p:spPr>
+        <p:txBody>
+          <a:bodyPr wrap="square" rtlCol="0">
+            <a:spAutoFit/>
+          </a:bodyPr>
+          <a:lstStyle/>
+          <a:p>
+            <a:pPr algn="ctr"/>
+            <a:r>
+              <a:rPr lang="en-US" sz="1200" dirty="0" smtClean="0">
+                <a:latin typeface="Courier New"/>
+                <a:cs typeface="Courier New"/>
+              </a:rPr>
+              <a:t>body</a:t>
             </a:r>
             <a:endParaRPr lang="en-US" sz="1200" dirty="0">
               <a:latin typeface="Courier New"/>

</xml_diff>